<commit_message>
Finally started adding the Stanford parser. First usage case is the tokenizer, which can now use the standard tokenizer Stanford parser. Not sure where to add the POS transformer yet
</commit_message>
<xml_diff>
--- a/Resources/Documentation/Data-Design.pptx
+++ b/Resources/Documentation/Data-Design.pptx
@@ -294,7 +294,7 @@
             <a:fld id="{1D8BD707-D9CF-40AE-B4C6-C98DA3205C09}" type="datetimeFigureOut">
               <a:rPr lang="en-US" smtClean="0"/>
               <a:pPr/>
-              <a:t>8/11/2012</a:t>
+              <a:t>9/20/2012</a:t>
             </a:fld>
             <a:endParaRPr lang="en-US"/>
           </a:p>
@@ -461,7 +461,7 @@
             <a:fld id="{1D8BD707-D9CF-40AE-B4C6-C98DA3205C09}" type="datetimeFigureOut">
               <a:rPr lang="en-US" smtClean="0"/>
               <a:pPr/>
-              <a:t>8/11/2012</a:t>
+              <a:t>9/20/2012</a:t>
             </a:fld>
             <a:endParaRPr lang="en-US"/>
           </a:p>
@@ -638,7 +638,7 @@
             <a:fld id="{1D8BD707-D9CF-40AE-B4C6-C98DA3205C09}" type="datetimeFigureOut">
               <a:rPr lang="en-US" smtClean="0"/>
               <a:pPr/>
-              <a:t>8/11/2012</a:t>
+              <a:t>9/20/2012</a:t>
             </a:fld>
             <a:endParaRPr lang="en-US"/>
           </a:p>
@@ -805,7 +805,7 @@
             <a:fld id="{1D8BD707-D9CF-40AE-B4C6-C98DA3205C09}" type="datetimeFigureOut">
               <a:rPr lang="en-US" smtClean="0"/>
               <a:pPr/>
-              <a:t>8/11/2012</a:t>
+              <a:t>9/20/2012</a:t>
             </a:fld>
             <a:endParaRPr lang="en-US"/>
           </a:p>
@@ -1048,7 +1048,7 @@
             <a:fld id="{1D8BD707-D9CF-40AE-B4C6-C98DA3205C09}" type="datetimeFigureOut">
               <a:rPr lang="en-US" smtClean="0"/>
               <a:pPr/>
-              <a:t>8/11/2012</a:t>
+              <a:t>9/20/2012</a:t>
             </a:fld>
             <a:endParaRPr lang="en-US"/>
           </a:p>
@@ -1333,7 +1333,7 @@
             <a:fld id="{1D8BD707-D9CF-40AE-B4C6-C98DA3205C09}" type="datetimeFigureOut">
               <a:rPr lang="en-US" smtClean="0"/>
               <a:pPr/>
-              <a:t>8/11/2012</a:t>
+              <a:t>9/20/2012</a:t>
             </a:fld>
             <a:endParaRPr lang="en-US"/>
           </a:p>
@@ -1752,7 +1752,7 @@
             <a:fld id="{1D8BD707-D9CF-40AE-B4C6-C98DA3205C09}" type="datetimeFigureOut">
               <a:rPr lang="en-US" smtClean="0"/>
               <a:pPr/>
-              <a:t>8/11/2012</a:t>
+              <a:t>9/20/2012</a:t>
             </a:fld>
             <a:endParaRPr lang="en-US"/>
           </a:p>
@@ -1867,7 +1867,7 @@
             <a:fld id="{1D8BD707-D9CF-40AE-B4C6-C98DA3205C09}" type="datetimeFigureOut">
               <a:rPr lang="en-US" smtClean="0"/>
               <a:pPr/>
-              <a:t>8/11/2012</a:t>
+              <a:t>9/20/2012</a:t>
             </a:fld>
             <a:endParaRPr lang="en-US"/>
           </a:p>
@@ -1959,7 +1959,7 @@
             <a:fld id="{1D8BD707-D9CF-40AE-B4C6-C98DA3205C09}" type="datetimeFigureOut">
               <a:rPr lang="en-US" smtClean="0"/>
               <a:pPr/>
-              <a:t>8/11/2012</a:t>
+              <a:t>9/20/2012</a:t>
             </a:fld>
             <a:endParaRPr lang="en-US"/>
           </a:p>
@@ -2233,7 +2233,7 @@
             <a:fld id="{1D8BD707-D9CF-40AE-B4C6-C98DA3205C09}" type="datetimeFigureOut">
               <a:rPr lang="en-US" smtClean="0"/>
               <a:pPr/>
-              <a:t>8/11/2012</a:t>
+              <a:t>9/20/2012</a:t>
             </a:fld>
             <a:endParaRPr lang="en-US"/>
           </a:p>
@@ -2483,7 +2483,7 @@
             <a:fld id="{1D8BD707-D9CF-40AE-B4C6-C98DA3205C09}" type="datetimeFigureOut">
               <a:rPr lang="en-US" smtClean="0"/>
               <a:pPr/>
-              <a:t>8/11/2012</a:t>
+              <a:t>9/20/2012</a:t>
             </a:fld>
             <a:endParaRPr lang="en-US"/>
           </a:p>
@@ -2693,7 +2693,7 @@
             <a:fld id="{1D8BD707-D9CF-40AE-B4C6-C98DA3205C09}" type="datetimeFigureOut">
               <a:rPr lang="en-US" smtClean="0"/>
               <a:pPr/>
-              <a:t>8/11/2012</a:t>
+              <a:t>9/20/2012</a:t>
             </a:fld>
             <a:endParaRPr lang="en-US"/>
           </a:p>
@@ -3764,15 +3764,7 @@
           <a:p>
             <a:r>
               <a:rPr lang="en-US" sz="2400" dirty="0" smtClean="0"/>
-              <a:t>Extended Data </a:t>
-            </a:r>
-            <a:r>
-              <a:rPr lang="en-US" sz="2400" dirty="0" smtClean="0"/>
-              <a:t>for Type</a:t>
-            </a:r>
-            <a:r>
-              <a:rPr lang="en-US" sz="2400" dirty="0" smtClean="0"/>
-              <a:t>: </a:t>
+              <a:t>Extended Data for Type: </a:t>
             </a:r>
             <a:r>
               <a:rPr lang="en-US" sz="2400" b="1" dirty="0" err="1" smtClean="0"/>
@@ -3997,11 +3989,6 @@
               </a:rPr>
               <a:t>String</a:t>
             </a:r>
-            <a:endParaRPr lang="en-US" sz="1400" b="1" dirty="0" smtClean="0">
-              <a:solidFill>
-                <a:schemeClr val="tx1"/>
-              </a:solidFill>
-            </a:endParaRPr>
           </a:p>
         </p:txBody>
       </p:sp>
@@ -4066,11 +4053,6 @@
               </a:rPr>
               <a:t>String</a:t>
             </a:r>
-            <a:endParaRPr lang="en-US" sz="1400" b="1" dirty="0" smtClean="0">
-              <a:solidFill>
-                <a:schemeClr val="tx1"/>
-              </a:solidFill>
-            </a:endParaRPr>
           </a:p>
         </p:txBody>
       </p:sp>
@@ -4369,21 +4351,8 @@
                   <a:schemeClr val="tx1"/>
                 </a:solidFill>
               </a:rPr>
-              <a:t>Default: </a:t>
-            </a:r>
-            <a:r>
-              <a:rPr lang="en-US" sz="1400" b="1" dirty="0" smtClean="0">
-                <a:solidFill>
-                  <a:schemeClr val="tx1"/>
-                </a:solidFill>
-              </a:rPr>
-              <a:t>String</a:t>
-            </a:r>
-            <a:endParaRPr lang="en-US" sz="1400" b="1" dirty="0" smtClean="0">
-              <a:solidFill>
-                <a:schemeClr val="tx1"/>
-              </a:solidFill>
-            </a:endParaRPr>
+              <a:t>Default: String</a:t>
+            </a:r>
           </a:p>
         </p:txBody>
       </p:sp>
@@ -4448,11 +4417,6 @@
               </a:rPr>
               <a:t>String</a:t>
             </a:r>
-            <a:endParaRPr lang="en-US" sz="1400" b="1" dirty="0" smtClean="0">
-              <a:solidFill>
-                <a:schemeClr val="tx1"/>
-              </a:solidFill>
-            </a:endParaRPr>
           </a:p>
         </p:txBody>
       </p:sp>
@@ -4480,11 +4444,7 @@
           <a:p>
             <a:r>
               <a:rPr lang="en-US" sz="2400" dirty="0" smtClean="0"/>
-              <a:t>Data </a:t>
-            </a:r>
-            <a:r>
-              <a:rPr lang="en-US" sz="2400" dirty="0" smtClean="0"/>
-              <a:t>Type: </a:t>
+              <a:t>Data Type: </a:t>
             </a:r>
             <a:r>
               <a:rPr lang="en-US" sz="2400" dirty="0" err="1" smtClean="0"/>
@@ -4731,21 +4691,8 @@
                   <a:schemeClr val="tx1"/>
                 </a:solidFill>
               </a:rPr>
-              <a:t>Default: </a:t>
-            </a:r>
-            <a:r>
-              <a:rPr lang="en-US" sz="1400" b="1" dirty="0" smtClean="0">
-                <a:solidFill>
-                  <a:schemeClr val="tx1"/>
-                </a:solidFill>
-              </a:rPr>
-              <a:t>String</a:t>
-            </a:r>
-            <a:endParaRPr lang="en-US" sz="1400" b="1" dirty="0" smtClean="0">
-              <a:solidFill>
-                <a:schemeClr val="tx1"/>
-              </a:solidFill>
-            </a:endParaRPr>
+              <a:t>Default: String</a:t>
+            </a:r>
           </a:p>
         </p:txBody>
       </p:sp>
@@ -5062,11 +5009,6 @@
               </a:rPr>
               <a:t>String</a:t>
             </a:r>
-            <a:endParaRPr lang="en-US" sz="1400" b="1" dirty="0" smtClean="0">
-              <a:solidFill>
-                <a:schemeClr val="tx1"/>
-              </a:solidFill>
-            </a:endParaRPr>
           </a:p>
         </p:txBody>
       </p:sp>
@@ -5131,11 +5073,6 @@
               </a:rPr>
               <a:t>String</a:t>
             </a:r>
-            <a:endParaRPr lang="en-US" sz="1400" b="1" dirty="0" smtClean="0">
-              <a:solidFill>
-                <a:schemeClr val="tx1"/>
-              </a:solidFill>
-            </a:endParaRPr>
           </a:p>
         </p:txBody>
       </p:sp>
@@ -5448,21 +5385,8 @@
                     <a:schemeClr val="tx1"/>
                   </a:solidFill>
                 </a:rPr>
-                <a:t>Default: </a:t>
+                <a:t>Default: String</a:t>
               </a:r>
-              <a:r>
-                <a:rPr lang="en-US" sz="1400" b="1" dirty="0" smtClean="0">
-                  <a:solidFill>
-                    <a:schemeClr val="tx1"/>
-                  </a:solidFill>
-                </a:rPr>
-                <a:t>String</a:t>
-              </a:r>
-              <a:endParaRPr lang="en-US" sz="1400" b="1" dirty="0" smtClean="0">
-                <a:solidFill>
-                  <a:schemeClr val="tx1"/>
-                </a:solidFill>
-              </a:endParaRPr>
             </a:p>
           </p:txBody>
         </p:sp>
@@ -5527,11 +5451,6 @@
                 </a:rPr>
                 <a:t>String</a:t>
               </a:r>
-              <a:endParaRPr lang="en-US" sz="1400" b="1" dirty="0" smtClean="0">
-                <a:solidFill>
-                  <a:schemeClr val="tx1"/>
-                </a:solidFill>
-              </a:endParaRPr>
             </a:p>
           </p:txBody>
         </p:sp>
@@ -5559,11 +5478,7 @@
             <a:p>
               <a:r>
                 <a:rPr lang="en-US" sz="2400" dirty="0" smtClean="0"/>
-                <a:t>Data </a:t>
-              </a:r>
-              <a:r>
-                <a:rPr lang="en-US" sz="2400" dirty="0" smtClean="0"/>
-                <a:t>Type: </a:t>
+                <a:t>Data Type: </a:t>
               </a:r>
               <a:r>
                 <a:rPr lang="en-US" sz="2400" dirty="0" err="1" smtClean="0"/>
@@ -5825,21 +5740,8 @@
                     <a:schemeClr val="tx1"/>
                   </a:solidFill>
                 </a:rPr>
-                <a:t>Default: </a:t>
+                <a:t>Default: Boolean</a:t>
               </a:r>
-              <a:r>
-                <a:rPr lang="en-US" sz="1400" b="1" dirty="0" smtClean="0">
-                  <a:solidFill>
-                    <a:schemeClr val="tx1"/>
-                  </a:solidFill>
-                </a:rPr>
-                <a:t>Boolean</a:t>
-              </a:r>
-              <a:endParaRPr lang="en-US" sz="1400" b="1" dirty="0" smtClean="0">
-                <a:solidFill>
-                  <a:schemeClr val="tx1"/>
-                </a:solidFill>
-              </a:endParaRPr>
             </a:p>
           </p:txBody>
         </p:sp>
@@ -5904,11 +5806,6 @@
                 </a:rPr>
                 <a:t>String</a:t>
               </a:r>
-              <a:endParaRPr lang="en-US" sz="1400" b="1" dirty="0" smtClean="0">
-                <a:solidFill>
-                  <a:schemeClr val="tx1"/>
-                </a:solidFill>
-              </a:endParaRPr>
             </a:p>
           </p:txBody>
         </p:sp>
@@ -5936,11 +5833,7 @@
             <a:p>
               <a:r>
                 <a:rPr lang="en-US" sz="2400" dirty="0" smtClean="0"/>
-                <a:t>Data </a:t>
-              </a:r>
-              <a:r>
-                <a:rPr lang="en-US" sz="2400" dirty="0" smtClean="0"/>
-                <a:t>Type: </a:t>
+                <a:t>Data Type: </a:t>
               </a:r>
               <a:r>
                 <a:rPr lang="en-US" sz="2400" dirty="0" err="1" smtClean="0"/>
@@ -6202,21 +6095,8 @@
                     <a:schemeClr val="tx1"/>
                   </a:solidFill>
                 </a:rPr>
-                <a:t>Default: </a:t>
+                <a:t>Default: Float</a:t>
               </a:r>
-              <a:r>
-                <a:rPr lang="en-US" sz="1400" b="1" dirty="0" smtClean="0">
-                  <a:solidFill>
-                    <a:schemeClr val="tx1"/>
-                  </a:solidFill>
-                </a:rPr>
-                <a:t>Float</a:t>
-              </a:r>
-              <a:endParaRPr lang="en-US" sz="1400" b="1" dirty="0" smtClean="0">
-                <a:solidFill>
-                  <a:schemeClr val="tx1"/>
-                </a:solidFill>
-              </a:endParaRPr>
             </a:p>
           </p:txBody>
         </p:sp>
@@ -6281,11 +6161,6 @@
                 </a:rPr>
                 <a:t>String</a:t>
               </a:r>
-              <a:endParaRPr lang="en-US" sz="1400" b="1" dirty="0" smtClean="0">
-                <a:solidFill>
-                  <a:schemeClr val="tx1"/>
-                </a:solidFill>
-              </a:endParaRPr>
             </a:p>
           </p:txBody>
         </p:sp>
@@ -6313,11 +6188,7 @@
             <a:p>
               <a:r>
                 <a:rPr lang="en-US" sz="2400" dirty="0" smtClean="0"/>
-                <a:t>Data </a:t>
-              </a:r>
-              <a:r>
-                <a:rPr lang="en-US" sz="2400" dirty="0" smtClean="0"/>
-                <a:t>Type: </a:t>
+                <a:t>Data Type: </a:t>
               </a:r>
               <a:r>
                 <a:rPr lang="en-US" sz="2400" dirty="0" err="1" smtClean="0"/>
@@ -6353,6 +6224,1480 @@
           <a:chExt cx="0" cy="0"/>
         </a:xfrm>
       </p:grpSpPr>
+      <p:sp>
+        <p:nvSpPr>
+          <p:cNvPr id="8" name="Rounded Rectangle 7"/>
+          <p:cNvSpPr/>
+          <p:nvPr/>
+        </p:nvSpPr>
+        <p:spPr>
+          <a:xfrm>
+            <a:off x="228600" y="228600"/>
+            <a:ext cx="8686800" cy="6400800"/>
+          </a:xfrm>
+          <a:prstGeom prst="roundRect">
+            <a:avLst>
+              <a:gd name="adj" fmla="val 3907"/>
+            </a:avLst>
+          </a:prstGeom>
+          <a:solidFill>
+            <a:schemeClr val="bg1">
+              <a:lumMod val="75000"/>
+            </a:schemeClr>
+          </a:solidFill>
+          <a:ln>
+            <a:solidFill>
+              <a:schemeClr val="tx1"/>
+            </a:solidFill>
+          </a:ln>
+        </p:spPr>
+        <p:style>
+          <a:lnRef idx="2">
+            <a:schemeClr val="accent1">
+              <a:shade val="50000"/>
+            </a:schemeClr>
+          </a:lnRef>
+          <a:fillRef idx="1">
+            <a:schemeClr val="accent1"/>
+          </a:fillRef>
+          <a:effectRef idx="0">
+            <a:schemeClr val="accent1"/>
+          </a:effectRef>
+          <a:fontRef idx="minor">
+            <a:schemeClr val="lt1"/>
+          </a:fontRef>
+        </p:style>
+        <p:txBody>
+          <a:bodyPr rtlCol="0" anchor="ctr"/>
+          <a:lstStyle/>
+          <a:p>
+            <a:pPr algn="ctr"/>
+            <a:endParaRPr lang="en-US" b="1" dirty="0">
+              <a:solidFill>
+                <a:schemeClr val="tx1"/>
+              </a:solidFill>
+            </a:endParaRPr>
+          </a:p>
+        </p:txBody>
+      </p:sp>
+      <p:sp>
+        <p:nvSpPr>
+          <p:cNvPr id="9" name="Rounded Rectangle 8"/>
+          <p:cNvSpPr/>
+          <p:nvPr/>
+        </p:nvSpPr>
+        <p:spPr>
+          <a:xfrm>
+            <a:off x="381000" y="2743200"/>
+            <a:ext cx="8382000" cy="3733800"/>
+          </a:xfrm>
+          <a:prstGeom prst="roundRect">
+            <a:avLst>
+              <a:gd name="adj" fmla="val 3907"/>
+            </a:avLst>
+          </a:prstGeom>
+          <a:solidFill>
+            <a:schemeClr val="bg1">
+              <a:lumMod val="85000"/>
+            </a:schemeClr>
+          </a:solidFill>
+          <a:ln>
+            <a:solidFill>
+              <a:schemeClr val="tx1"/>
+            </a:solidFill>
+          </a:ln>
+        </p:spPr>
+        <p:style>
+          <a:lnRef idx="2">
+            <a:schemeClr val="accent1">
+              <a:shade val="50000"/>
+            </a:schemeClr>
+          </a:lnRef>
+          <a:fillRef idx="1">
+            <a:schemeClr val="accent1"/>
+          </a:fillRef>
+          <a:effectRef idx="0">
+            <a:schemeClr val="accent1"/>
+          </a:effectRef>
+          <a:fontRef idx="minor">
+            <a:schemeClr val="lt1"/>
+          </a:fontRef>
+        </p:style>
+        <p:txBody>
+          <a:bodyPr rtlCol="0" anchor="ctr"/>
+          <a:lstStyle/>
+          <a:p>
+            <a:pPr algn="ctr"/>
+            <a:endParaRPr lang="en-US" b="1" dirty="0">
+              <a:solidFill>
+                <a:schemeClr val="tx1"/>
+              </a:solidFill>
+            </a:endParaRPr>
+          </a:p>
+        </p:txBody>
+      </p:sp>
+      <p:sp>
+        <p:nvSpPr>
+          <p:cNvPr id="2" name="Rounded Rectangle 1"/>
+          <p:cNvSpPr/>
+          <p:nvPr/>
+        </p:nvSpPr>
+        <p:spPr>
+          <a:xfrm>
+            <a:off x="1981200" y="3276600"/>
+            <a:ext cx="6705600" cy="457200"/>
+          </a:xfrm>
+          <a:prstGeom prst="roundRect">
+            <a:avLst/>
+          </a:prstGeom>
+          <a:solidFill>
+            <a:schemeClr val="bg1">
+              <a:lumMod val="95000"/>
+            </a:schemeClr>
+          </a:solidFill>
+          <a:ln>
+            <a:solidFill>
+              <a:schemeClr val="tx1"/>
+            </a:solidFill>
+          </a:ln>
+        </p:spPr>
+        <p:style>
+          <a:lnRef idx="2">
+            <a:schemeClr val="accent1">
+              <a:shade val="50000"/>
+            </a:schemeClr>
+          </a:lnRef>
+          <a:fillRef idx="1">
+            <a:schemeClr val="accent1"/>
+          </a:fillRef>
+          <a:effectRef idx="0">
+            <a:schemeClr val="accent1"/>
+          </a:effectRef>
+          <a:fontRef idx="minor">
+            <a:schemeClr val="lt1"/>
+          </a:fontRef>
+        </p:style>
+        <p:txBody>
+          <a:bodyPr rtlCol="0" anchor="ctr"/>
+          <a:lstStyle/>
+          <a:p>
+            <a:pPr algn="ctr"/>
+            <a:endParaRPr lang="en-US" b="1" dirty="0">
+              <a:solidFill>
+                <a:schemeClr val="tx1"/>
+              </a:solidFill>
+            </a:endParaRPr>
+          </a:p>
+        </p:txBody>
+      </p:sp>
+      <p:sp>
+        <p:nvSpPr>
+          <p:cNvPr id="3" name="Rounded Rectangle 2"/>
+          <p:cNvSpPr/>
+          <p:nvPr/>
+        </p:nvSpPr>
+        <p:spPr>
+          <a:xfrm>
+            <a:off x="2057400" y="3352800"/>
+            <a:ext cx="838200" cy="302260"/>
+          </a:xfrm>
+          <a:prstGeom prst="roundRect">
+            <a:avLst/>
+          </a:prstGeom>
+          <a:solidFill>
+            <a:schemeClr val="bg1">
+              <a:lumMod val="85000"/>
+            </a:schemeClr>
+          </a:solidFill>
+          <a:ln>
+            <a:solidFill>
+              <a:schemeClr val="tx1"/>
+            </a:solidFill>
+          </a:ln>
+        </p:spPr>
+        <p:style>
+          <a:lnRef idx="2">
+            <a:schemeClr val="accent1">
+              <a:shade val="50000"/>
+            </a:schemeClr>
+          </a:lnRef>
+          <a:fillRef idx="1">
+            <a:schemeClr val="accent1"/>
+          </a:fillRef>
+          <a:effectRef idx="0">
+            <a:schemeClr val="accent1"/>
+          </a:effectRef>
+          <a:fontRef idx="minor">
+            <a:schemeClr val="lt1"/>
+          </a:fontRef>
+        </p:style>
+        <p:txBody>
+          <a:bodyPr rtlCol="0" anchor="ctr"/>
+          <a:lstStyle/>
+          <a:p>
+            <a:pPr algn="ctr"/>
+            <a:r>
+              <a:rPr lang="en-US" b="1" dirty="0" smtClean="0">
+                <a:solidFill>
+                  <a:schemeClr val="tx1"/>
+                </a:solidFill>
+              </a:rPr>
+              <a:t>Key</a:t>
+            </a:r>
+            <a:endParaRPr lang="en-US" b="1" dirty="0">
+              <a:solidFill>
+                <a:schemeClr val="tx1"/>
+              </a:solidFill>
+            </a:endParaRPr>
+          </a:p>
+        </p:txBody>
+      </p:sp>
+      <p:sp>
+        <p:nvSpPr>
+          <p:cNvPr id="4" name="Rounded Rectangle 3"/>
+          <p:cNvSpPr/>
+          <p:nvPr/>
+        </p:nvSpPr>
+        <p:spPr>
+          <a:xfrm>
+            <a:off x="2971800" y="3352800"/>
+            <a:ext cx="1442508" cy="302260"/>
+          </a:xfrm>
+          <a:prstGeom prst="roundRect">
+            <a:avLst/>
+          </a:prstGeom>
+          <a:solidFill>
+            <a:schemeClr val="bg1">
+              <a:lumMod val="85000"/>
+            </a:schemeClr>
+          </a:solidFill>
+          <a:ln>
+            <a:solidFill>
+              <a:schemeClr val="tx1"/>
+            </a:solidFill>
+          </a:ln>
+        </p:spPr>
+        <p:style>
+          <a:lnRef idx="2">
+            <a:schemeClr val="accent1">
+              <a:shade val="50000"/>
+            </a:schemeClr>
+          </a:lnRef>
+          <a:fillRef idx="1">
+            <a:schemeClr val="accent1"/>
+          </a:fillRef>
+          <a:effectRef idx="0">
+            <a:schemeClr val="accent1"/>
+          </a:effectRef>
+          <a:fontRef idx="minor">
+            <a:schemeClr val="lt1"/>
+          </a:fontRef>
+        </p:style>
+        <p:txBody>
+          <a:bodyPr rtlCol="0" anchor="ctr"/>
+          <a:lstStyle/>
+          <a:p>
+            <a:pPr algn="ctr"/>
+            <a:r>
+              <a:rPr lang="en-US" b="1" dirty="0" smtClean="0">
+                <a:solidFill>
+                  <a:schemeClr val="tx1"/>
+                </a:solidFill>
+              </a:rPr>
+              <a:t>Token 1</a:t>
+            </a:r>
+            <a:endParaRPr lang="en-US" b="1" dirty="0">
+              <a:solidFill>
+                <a:schemeClr val="tx1"/>
+              </a:solidFill>
+            </a:endParaRPr>
+          </a:p>
+        </p:txBody>
+      </p:sp>
+      <p:sp>
+        <p:nvSpPr>
+          <p:cNvPr id="10" name="Rounded Rectangle 9"/>
+          <p:cNvSpPr/>
+          <p:nvPr/>
+        </p:nvSpPr>
+        <p:spPr>
+          <a:xfrm>
+            <a:off x="304800" y="304800"/>
+            <a:ext cx="2057400" cy="302260"/>
+          </a:xfrm>
+          <a:prstGeom prst="roundRect">
+            <a:avLst/>
+          </a:prstGeom>
+          <a:noFill/>
+          <a:ln>
+            <a:noFill/>
+          </a:ln>
+        </p:spPr>
+        <p:style>
+          <a:lnRef idx="2">
+            <a:schemeClr val="accent1">
+              <a:shade val="50000"/>
+            </a:schemeClr>
+          </a:lnRef>
+          <a:fillRef idx="1">
+            <a:schemeClr val="accent1"/>
+          </a:fillRef>
+          <a:effectRef idx="0">
+            <a:schemeClr val="accent1"/>
+          </a:effectRef>
+          <a:fontRef idx="minor">
+            <a:schemeClr val="lt1"/>
+          </a:fontRef>
+        </p:style>
+        <p:txBody>
+          <a:bodyPr rtlCol="0" anchor="ctr"/>
+          <a:lstStyle/>
+          <a:p>
+            <a:pPr algn="ctr"/>
+            <a:r>
+              <a:rPr lang="en-US" b="1" dirty="0" err="1" smtClean="0">
+                <a:solidFill>
+                  <a:schemeClr val="tx1"/>
+                </a:solidFill>
+              </a:rPr>
+              <a:t>HoopKVDocument</a:t>
+            </a:r>
+            <a:endParaRPr lang="en-US" b="1" dirty="0">
+              <a:solidFill>
+                <a:schemeClr val="tx1"/>
+              </a:solidFill>
+            </a:endParaRPr>
+          </a:p>
+        </p:txBody>
+      </p:sp>
+      <p:sp>
+        <p:nvSpPr>
+          <p:cNvPr id="11" name="Rounded Rectangle 10"/>
+          <p:cNvSpPr/>
+          <p:nvPr/>
+        </p:nvSpPr>
+        <p:spPr>
+          <a:xfrm>
+            <a:off x="457200" y="2819400"/>
+            <a:ext cx="1981200" cy="302260"/>
+          </a:xfrm>
+          <a:prstGeom prst="roundRect">
+            <a:avLst/>
+          </a:prstGeom>
+          <a:noFill/>
+          <a:ln>
+            <a:noFill/>
+          </a:ln>
+        </p:spPr>
+        <p:style>
+          <a:lnRef idx="2">
+            <a:schemeClr val="accent1">
+              <a:shade val="50000"/>
+            </a:schemeClr>
+          </a:lnRef>
+          <a:fillRef idx="1">
+            <a:schemeClr val="accent1"/>
+          </a:fillRef>
+          <a:effectRef idx="0">
+            <a:schemeClr val="accent1"/>
+          </a:effectRef>
+          <a:fontRef idx="minor">
+            <a:schemeClr val="lt1"/>
+          </a:fontRef>
+        </p:style>
+        <p:txBody>
+          <a:bodyPr rtlCol="0" anchor="ctr"/>
+          <a:lstStyle/>
+          <a:p>
+            <a:pPr algn="ctr"/>
+            <a:r>
+              <a:rPr lang="en-US" b="1" dirty="0" err="1" smtClean="0">
+                <a:solidFill>
+                  <a:schemeClr val="tx1"/>
+                </a:solidFill>
+              </a:rPr>
+              <a:t>HoopKVList</a:t>
+            </a:r>
+            <a:r>
+              <a:rPr lang="en-US" b="1" dirty="0" smtClean="0">
+                <a:solidFill>
+                  <a:schemeClr val="tx1"/>
+                </a:solidFill>
+              </a:rPr>
+              <a:t> views</a:t>
+            </a:r>
+            <a:endParaRPr lang="en-US" b="1" dirty="0">
+              <a:solidFill>
+                <a:schemeClr val="tx1"/>
+              </a:solidFill>
+            </a:endParaRPr>
+          </a:p>
+        </p:txBody>
+      </p:sp>
+      <p:sp>
+        <p:nvSpPr>
+          <p:cNvPr id="12" name="Rounded Rectangle 11"/>
+          <p:cNvSpPr/>
+          <p:nvPr/>
+        </p:nvSpPr>
+        <p:spPr>
+          <a:xfrm>
+            <a:off x="4495800" y="3352800"/>
+            <a:ext cx="1442508" cy="302260"/>
+          </a:xfrm>
+          <a:prstGeom prst="roundRect">
+            <a:avLst/>
+          </a:prstGeom>
+          <a:solidFill>
+            <a:schemeClr val="bg1">
+              <a:lumMod val="85000"/>
+            </a:schemeClr>
+          </a:solidFill>
+          <a:ln>
+            <a:solidFill>
+              <a:schemeClr val="tx1"/>
+            </a:solidFill>
+          </a:ln>
+        </p:spPr>
+        <p:style>
+          <a:lnRef idx="2">
+            <a:schemeClr val="accent1">
+              <a:shade val="50000"/>
+            </a:schemeClr>
+          </a:lnRef>
+          <a:fillRef idx="1">
+            <a:schemeClr val="accent1"/>
+          </a:fillRef>
+          <a:effectRef idx="0">
+            <a:schemeClr val="accent1"/>
+          </a:effectRef>
+          <a:fontRef idx="minor">
+            <a:schemeClr val="lt1"/>
+          </a:fontRef>
+        </p:style>
+        <p:txBody>
+          <a:bodyPr rtlCol="0" anchor="ctr"/>
+          <a:lstStyle/>
+          <a:p>
+            <a:pPr algn="ctr"/>
+            <a:r>
+              <a:rPr lang="en-US" b="1" dirty="0" smtClean="0">
+                <a:solidFill>
+                  <a:schemeClr val="tx1"/>
+                </a:solidFill>
+              </a:rPr>
+              <a:t>Token 2</a:t>
+            </a:r>
+            <a:endParaRPr lang="en-US" b="1" dirty="0">
+              <a:solidFill>
+                <a:schemeClr val="tx1"/>
+              </a:solidFill>
+            </a:endParaRPr>
+          </a:p>
+        </p:txBody>
+      </p:sp>
+      <p:sp>
+        <p:nvSpPr>
+          <p:cNvPr id="13" name="Rounded Rectangle 12"/>
+          <p:cNvSpPr/>
+          <p:nvPr/>
+        </p:nvSpPr>
+        <p:spPr>
+          <a:xfrm>
+            <a:off x="7162800" y="3352800"/>
+            <a:ext cx="1442508" cy="302260"/>
+          </a:xfrm>
+          <a:prstGeom prst="roundRect">
+            <a:avLst/>
+          </a:prstGeom>
+          <a:solidFill>
+            <a:schemeClr val="bg1">
+              <a:lumMod val="85000"/>
+            </a:schemeClr>
+          </a:solidFill>
+          <a:ln>
+            <a:solidFill>
+              <a:schemeClr val="tx1"/>
+            </a:solidFill>
+          </a:ln>
+        </p:spPr>
+        <p:style>
+          <a:lnRef idx="2">
+            <a:schemeClr val="accent1">
+              <a:shade val="50000"/>
+            </a:schemeClr>
+          </a:lnRef>
+          <a:fillRef idx="1">
+            <a:schemeClr val="accent1"/>
+          </a:fillRef>
+          <a:effectRef idx="0">
+            <a:schemeClr val="accent1"/>
+          </a:effectRef>
+          <a:fontRef idx="minor">
+            <a:schemeClr val="lt1"/>
+          </a:fontRef>
+        </p:style>
+        <p:txBody>
+          <a:bodyPr rtlCol="0" anchor="ctr"/>
+          <a:lstStyle/>
+          <a:p>
+            <a:pPr algn="ctr"/>
+            <a:r>
+              <a:rPr lang="en-US" b="1" dirty="0" smtClean="0">
+                <a:solidFill>
+                  <a:schemeClr val="tx1"/>
+                </a:solidFill>
+              </a:rPr>
+              <a:t>Token N</a:t>
+            </a:r>
+            <a:endParaRPr lang="en-US" b="1" dirty="0">
+              <a:solidFill>
+                <a:schemeClr val="tx1"/>
+              </a:solidFill>
+            </a:endParaRPr>
+          </a:p>
+        </p:txBody>
+      </p:sp>
+      <p:sp>
+        <p:nvSpPr>
+          <p:cNvPr id="14" name="Rounded Rectangle 13"/>
+          <p:cNvSpPr/>
+          <p:nvPr/>
+        </p:nvSpPr>
+        <p:spPr>
+          <a:xfrm>
+            <a:off x="6096000" y="3352800"/>
+            <a:ext cx="914400" cy="302260"/>
+          </a:xfrm>
+          <a:prstGeom prst="roundRect">
+            <a:avLst/>
+          </a:prstGeom>
+          <a:noFill/>
+          <a:ln>
+            <a:noFill/>
+          </a:ln>
+        </p:spPr>
+        <p:style>
+          <a:lnRef idx="2">
+            <a:schemeClr val="accent1">
+              <a:shade val="50000"/>
+            </a:schemeClr>
+          </a:lnRef>
+          <a:fillRef idx="1">
+            <a:schemeClr val="accent1"/>
+          </a:fillRef>
+          <a:effectRef idx="0">
+            <a:schemeClr val="accent1"/>
+          </a:effectRef>
+          <a:fontRef idx="minor">
+            <a:schemeClr val="lt1"/>
+          </a:fontRef>
+        </p:style>
+        <p:txBody>
+          <a:bodyPr rtlCol="0" anchor="ctr"/>
+          <a:lstStyle/>
+          <a:p>
+            <a:pPr algn="ctr"/>
+            <a:r>
+              <a:rPr lang="en-US" b="1" dirty="0" smtClean="0">
+                <a:solidFill>
+                  <a:schemeClr val="tx1"/>
+                </a:solidFill>
+              </a:rPr>
+              <a:t>…</a:t>
+            </a:r>
+            <a:endParaRPr lang="en-US" b="1" dirty="0">
+              <a:solidFill>
+                <a:schemeClr val="tx1"/>
+              </a:solidFill>
+            </a:endParaRPr>
+          </a:p>
+        </p:txBody>
+      </p:sp>
+      <p:sp>
+        <p:nvSpPr>
+          <p:cNvPr id="15" name="Rounded Rectangle 14"/>
+          <p:cNvSpPr/>
+          <p:nvPr/>
+        </p:nvSpPr>
+        <p:spPr>
+          <a:xfrm>
+            <a:off x="1981200" y="3962400"/>
+            <a:ext cx="6705600" cy="457200"/>
+          </a:xfrm>
+          <a:prstGeom prst="roundRect">
+            <a:avLst/>
+          </a:prstGeom>
+          <a:solidFill>
+            <a:schemeClr val="bg1">
+              <a:lumMod val="95000"/>
+            </a:schemeClr>
+          </a:solidFill>
+          <a:ln>
+            <a:solidFill>
+              <a:schemeClr val="tx1"/>
+            </a:solidFill>
+          </a:ln>
+        </p:spPr>
+        <p:style>
+          <a:lnRef idx="2">
+            <a:schemeClr val="accent1">
+              <a:shade val="50000"/>
+            </a:schemeClr>
+          </a:lnRef>
+          <a:fillRef idx="1">
+            <a:schemeClr val="accent1"/>
+          </a:fillRef>
+          <a:effectRef idx="0">
+            <a:schemeClr val="accent1"/>
+          </a:effectRef>
+          <a:fontRef idx="minor">
+            <a:schemeClr val="lt1"/>
+          </a:fontRef>
+        </p:style>
+        <p:txBody>
+          <a:bodyPr rtlCol="0" anchor="ctr"/>
+          <a:lstStyle/>
+          <a:p>
+            <a:pPr algn="ctr"/>
+            <a:endParaRPr lang="en-US" b="1" dirty="0">
+              <a:solidFill>
+                <a:schemeClr val="tx1"/>
+              </a:solidFill>
+            </a:endParaRPr>
+          </a:p>
+        </p:txBody>
+      </p:sp>
+      <p:sp>
+        <p:nvSpPr>
+          <p:cNvPr id="16" name="Rounded Rectangle 15"/>
+          <p:cNvSpPr/>
+          <p:nvPr/>
+        </p:nvSpPr>
+        <p:spPr>
+          <a:xfrm>
+            <a:off x="2057400" y="4038600"/>
+            <a:ext cx="838200" cy="302260"/>
+          </a:xfrm>
+          <a:prstGeom prst="roundRect">
+            <a:avLst/>
+          </a:prstGeom>
+          <a:solidFill>
+            <a:schemeClr val="bg1">
+              <a:lumMod val="85000"/>
+            </a:schemeClr>
+          </a:solidFill>
+          <a:ln>
+            <a:solidFill>
+              <a:schemeClr val="tx1"/>
+            </a:solidFill>
+          </a:ln>
+        </p:spPr>
+        <p:style>
+          <a:lnRef idx="2">
+            <a:schemeClr val="accent1">
+              <a:shade val="50000"/>
+            </a:schemeClr>
+          </a:lnRef>
+          <a:fillRef idx="1">
+            <a:schemeClr val="accent1"/>
+          </a:fillRef>
+          <a:effectRef idx="0">
+            <a:schemeClr val="accent1"/>
+          </a:effectRef>
+          <a:fontRef idx="minor">
+            <a:schemeClr val="lt1"/>
+          </a:fontRef>
+        </p:style>
+        <p:txBody>
+          <a:bodyPr rtlCol="0" anchor="ctr"/>
+          <a:lstStyle/>
+          <a:p>
+            <a:pPr algn="ctr"/>
+            <a:r>
+              <a:rPr lang="en-US" b="1" dirty="0" smtClean="0">
+                <a:solidFill>
+                  <a:schemeClr val="tx1"/>
+                </a:solidFill>
+              </a:rPr>
+              <a:t>Key</a:t>
+            </a:r>
+            <a:endParaRPr lang="en-US" b="1" dirty="0">
+              <a:solidFill>
+                <a:schemeClr val="tx1"/>
+              </a:solidFill>
+            </a:endParaRPr>
+          </a:p>
+        </p:txBody>
+      </p:sp>
+      <p:sp>
+        <p:nvSpPr>
+          <p:cNvPr id="17" name="Rounded Rectangle 16"/>
+          <p:cNvSpPr/>
+          <p:nvPr/>
+        </p:nvSpPr>
+        <p:spPr>
+          <a:xfrm>
+            <a:off x="2971800" y="4038600"/>
+            <a:ext cx="1442508" cy="302260"/>
+          </a:xfrm>
+          <a:prstGeom prst="roundRect">
+            <a:avLst/>
+          </a:prstGeom>
+          <a:solidFill>
+            <a:schemeClr val="bg1">
+              <a:lumMod val="85000"/>
+            </a:schemeClr>
+          </a:solidFill>
+          <a:ln>
+            <a:solidFill>
+              <a:schemeClr val="tx1"/>
+            </a:solidFill>
+          </a:ln>
+        </p:spPr>
+        <p:style>
+          <a:lnRef idx="2">
+            <a:schemeClr val="accent1">
+              <a:shade val="50000"/>
+            </a:schemeClr>
+          </a:lnRef>
+          <a:fillRef idx="1">
+            <a:schemeClr val="accent1"/>
+          </a:fillRef>
+          <a:effectRef idx="0">
+            <a:schemeClr val="accent1"/>
+          </a:effectRef>
+          <a:fontRef idx="minor">
+            <a:schemeClr val="lt1"/>
+          </a:fontRef>
+        </p:style>
+        <p:txBody>
+          <a:bodyPr rtlCol="0" anchor="ctr"/>
+          <a:lstStyle/>
+          <a:p>
+            <a:pPr algn="ctr"/>
+            <a:r>
+              <a:rPr lang="en-US" b="1" dirty="0" smtClean="0">
+                <a:solidFill>
+                  <a:schemeClr val="tx1"/>
+                </a:solidFill>
+              </a:rPr>
+              <a:t>Token 1</a:t>
+            </a:r>
+            <a:endParaRPr lang="en-US" b="1" dirty="0">
+              <a:solidFill>
+                <a:schemeClr val="tx1"/>
+              </a:solidFill>
+            </a:endParaRPr>
+          </a:p>
+        </p:txBody>
+      </p:sp>
+      <p:sp>
+        <p:nvSpPr>
+          <p:cNvPr id="18" name="Rounded Rectangle 17"/>
+          <p:cNvSpPr/>
+          <p:nvPr/>
+        </p:nvSpPr>
+        <p:spPr>
+          <a:xfrm>
+            <a:off x="4495800" y="4038600"/>
+            <a:ext cx="1442508" cy="302260"/>
+          </a:xfrm>
+          <a:prstGeom prst="roundRect">
+            <a:avLst/>
+          </a:prstGeom>
+          <a:solidFill>
+            <a:schemeClr val="bg1">
+              <a:lumMod val="85000"/>
+            </a:schemeClr>
+          </a:solidFill>
+          <a:ln>
+            <a:solidFill>
+              <a:schemeClr val="tx1"/>
+            </a:solidFill>
+          </a:ln>
+        </p:spPr>
+        <p:style>
+          <a:lnRef idx="2">
+            <a:schemeClr val="accent1">
+              <a:shade val="50000"/>
+            </a:schemeClr>
+          </a:lnRef>
+          <a:fillRef idx="1">
+            <a:schemeClr val="accent1"/>
+          </a:fillRef>
+          <a:effectRef idx="0">
+            <a:schemeClr val="accent1"/>
+          </a:effectRef>
+          <a:fontRef idx="minor">
+            <a:schemeClr val="lt1"/>
+          </a:fontRef>
+        </p:style>
+        <p:txBody>
+          <a:bodyPr rtlCol="0" anchor="ctr"/>
+          <a:lstStyle/>
+          <a:p>
+            <a:pPr algn="ctr"/>
+            <a:r>
+              <a:rPr lang="en-US" b="1" dirty="0" smtClean="0">
+                <a:solidFill>
+                  <a:schemeClr val="tx1"/>
+                </a:solidFill>
+              </a:rPr>
+              <a:t>Token 2</a:t>
+            </a:r>
+            <a:endParaRPr lang="en-US" b="1" dirty="0">
+              <a:solidFill>
+                <a:schemeClr val="tx1"/>
+              </a:solidFill>
+            </a:endParaRPr>
+          </a:p>
+        </p:txBody>
+      </p:sp>
+      <p:sp>
+        <p:nvSpPr>
+          <p:cNvPr id="19" name="Rounded Rectangle 18"/>
+          <p:cNvSpPr/>
+          <p:nvPr/>
+        </p:nvSpPr>
+        <p:spPr>
+          <a:xfrm>
+            <a:off x="7162800" y="4038600"/>
+            <a:ext cx="1442508" cy="302260"/>
+          </a:xfrm>
+          <a:prstGeom prst="roundRect">
+            <a:avLst/>
+          </a:prstGeom>
+          <a:solidFill>
+            <a:schemeClr val="bg1">
+              <a:lumMod val="85000"/>
+            </a:schemeClr>
+          </a:solidFill>
+          <a:ln>
+            <a:solidFill>
+              <a:schemeClr val="tx1"/>
+            </a:solidFill>
+          </a:ln>
+        </p:spPr>
+        <p:style>
+          <a:lnRef idx="2">
+            <a:schemeClr val="accent1">
+              <a:shade val="50000"/>
+            </a:schemeClr>
+          </a:lnRef>
+          <a:fillRef idx="1">
+            <a:schemeClr val="accent1"/>
+          </a:fillRef>
+          <a:effectRef idx="0">
+            <a:schemeClr val="accent1"/>
+          </a:effectRef>
+          <a:fontRef idx="minor">
+            <a:schemeClr val="lt1"/>
+          </a:fontRef>
+        </p:style>
+        <p:txBody>
+          <a:bodyPr rtlCol="0" anchor="ctr"/>
+          <a:lstStyle/>
+          <a:p>
+            <a:pPr algn="ctr"/>
+            <a:r>
+              <a:rPr lang="en-US" b="1" dirty="0" smtClean="0">
+                <a:solidFill>
+                  <a:schemeClr val="tx1"/>
+                </a:solidFill>
+              </a:rPr>
+              <a:t>Token N</a:t>
+            </a:r>
+            <a:endParaRPr lang="en-US" b="1" dirty="0">
+              <a:solidFill>
+                <a:schemeClr val="tx1"/>
+              </a:solidFill>
+            </a:endParaRPr>
+          </a:p>
+        </p:txBody>
+      </p:sp>
+      <p:sp>
+        <p:nvSpPr>
+          <p:cNvPr id="20" name="Rounded Rectangle 19"/>
+          <p:cNvSpPr/>
+          <p:nvPr/>
+        </p:nvSpPr>
+        <p:spPr>
+          <a:xfrm>
+            <a:off x="6096000" y="4038600"/>
+            <a:ext cx="914400" cy="302260"/>
+          </a:xfrm>
+          <a:prstGeom prst="roundRect">
+            <a:avLst/>
+          </a:prstGeom>
+          <a:noFill/>
+          <a:ln>
+            <a:noFill/>
+          </a:ln>
+        </p:spPr>
+        <p:style>
+          <a:lnRef idx="2">
+            <a:schemeClr val="accent1">
+              <a:shade val="50000"/>
+            </a:schemeClr>
+          </a:lnRef>
+          <a:fillRef idx="1">
+            <a:schemeClr val="accent1"/>
+          </a:fillRef>
+          <a:effectRef idx="0">
+            <a:schemeClr val="accent1"/>
+          </a:effectRef>
+          <a:fontRef idx="minor">
+            <a:schemeClr val="lt1"/>
+          </a:fontRef>
+        </p:style>
+        <p:txBody>
+          <a:bodyPr rtlCol="0" anchor="ctr"/>
+          <a:lstStyle/>
+          <a:p>
+            <a:pPr algn="ctr"/>
+            <a:r>
+              <a:rPr lang="en-US" b="1" dirty="0" smtClean="0">
+                <a:solidFill>
+                  <a:schemeClr val="tx1"/>
+                </a:solidFill>
+              </a:rPr>
+              <a:t>…</a:t>
+            </a:r>
+            <a:endParaRPr lang="en-US" b="1" dirty="0">
+              <a:solidFill>
+                <a:schemeClr val="tx1"/>
+              </a:solidFill>
+            </a:endParaRPr>
+          </a:p>
+        </p:txBody>
+      </p:sp>
+      <p:sp>
+        <p:nvSpPr>
+          <p:cNvPr id="27" name="Rounded Rectangle 26"/>
+          <p:cNvSpPr/>
+          <p:nvPr/>
+        </p:nvSpPr>
+        <p:spPr>
+          <a:xfrm>
+            <a:off x="1981200" y="4648200"/>
+            <a:ext cx="6705600" cy="457200"/>
+          </a:xfrm>
+          <a:prstGeom prst="roundRect">
+            <a:avLst/>
+          </a:prstGeom>
+          <a:solidFill>
+            <a:schemeClr val="bg1">
+              <a:lumMod val="95000"/>
+            </a:schemeClr>
+          </a:solidFill>
+          <a:ln>
+            <a:solidFill>
+              <a:schemeClr val="tx1"/>
+            </a:solidFill>
+          </a:ln>
+        </p:spPr>
+        <p:style>
+          <a:lnRef idx="2">
+            <a:schemeClr val="accent1">
+              <a:shade val="50000"/>
+            </a:schemeClr>
+          </a:lnRef>
+          <a:fillRef idx="1">
+            <a:schemeClr val="accent1"/>
+          </a:fillRef>
+          <a:effectRef idx="0">
+            <a:schemeClr val="accent1"/>
+          </a:effectRef>
+          <a:fontRef idx="minor">
+            <a:schemeClr val="lt1"/>
+          </a:fontRef>
+        </p:style>
+        <p:txBody>
+          <a:bodyPr rtlCol="0" anchor="ctr"/>
+          <a:lstStyle/>
+          <a:p>
+            <a:pPr algn="ctr"/>
+            <a:endParaRPr lang="en-US" b="1" dirty="0">
+              <a:solidFill>
+                <a:schemeClr val="tx1"/>
+              </a:solidFill>
+            </a:endParaRPr>
+          </a:p>
+        </p:txBody>
+      </p:sp>
+      <p:sp>
+        <p:nvSpPr>
+          <p:cNvPr id="28" name="Rounded Rectangle 27"/>
+          <p:cNvSpPr/>
+          <p:nvPr/>
+        </p:nvSpPr>
+        <p:spPr>
+          <a:xfrm>
+            <a:off x="2057400" y="4724400"/>
+            <a:ext cx="838200" cy="302260"/>
+          </a:xfrm>
+          <a:prstGeom prst="roundRect">
+            <a:avLst/>
+          </a:prstGeom>
+          <a:solidFill>
+            <a:schemeClr val="bg1">
+              <a:lumMod val="85000"/>
+            </a:schemeClr>
+          </a:solidFill>
+          <a:ln>
+            <a:solidFill>
+              <a:schemeClr val="tx1"/>
+            </a:solidFill>
+          </a:ln>
+        </p:spPr>
+        <p:style>
+          <a:lnRef idx="2">
+            <a:schemeClr val="accent1">
+              <a:shade val="50000"/>
+            </a:schemeClr>
+          </a:lnRef>
+          <a:fillRef idx="1">
+            <a:schemeClr val="accent1"/>
+          </a:fillRef>
+          <a:effectRef idx="0">
+            <a:schemeClr val="accent1"/>
+          </a:effectRef>
+          <a:fontRef idx="minor">
+            <a:schemeClr val="lt1"/>
+          </a:fontRef>
+        </p:style>
+        <p:txBody>
+          <a:bodyPr rtlCol="0" anchor="ctr"/>
+          <a:lstStyle/>
+          <a:p>
+            <a:pPr algn="ctr"/>
+            <a:r>
+              <a:rPr lang="en-US" b="1" dirty="0" smtClean="0">
+                <a:solidFill>
+                  <a:schemeClr val="tx1"/>
+                </a:solidFill>
+              </a:rPr>
+              <a:t>Key</a:t>
+            </a:r>
+            <a:endParaRPr lang="en-US" b="1" dirty="0">
+              <a:solidFill>
+                <a:schemeClr val="tx1"/>
+              </a:solidFill>
+            </a:endParaRPr>
+          </a:p>
+        </p:txBody>
+      </p:sp>
+      <p:sp>
+        <p:nvSpPr>
+          <p:cNvPr id="29" name="Rounded Rectangle 28"/>
+          <p:cNvSpPr/>
+          <p:nvPr/>
+        </p:nvSpPr>
+        <p:spPr>
+          <a:xfrm>
+            <a:off x="2971800" y="4724400"/>
+            <a:ext cx="1442508" cy="302260"/>
+          </a:xfrm>
+          <a:prstGeom prst="roundRect">
+            <a:avLst/>
+          </a:prstGeom>
+          <a:solidFill>
+            <a:schemeClr val="bg1">
+              <a:lumMod val="85000"/>
+            </a:schemeClr>
+          </a:solidFill>
+          <a:ln>
+            <a:solidFill>
+              <a:schemeClr val="tx1"/>
+            </a:solidFill>
+          </a:ln>
+        </p:spPr>
+        <p:style>
+          <a:lnRef idx="2">
+            <a:schemeClr val="accent1">
+              <a:shade val="50000"/>
+            </a:schemeClr>
+          </a:lnRef>
+          <a:fillRef idx="1">
+            <a:schemeClr val="accent1"/>
+          </a:fillRef>
+          <a:effectRef idx="0">
+            <a:schemeClr val="accent1"/>
+          </a:effectRef>
+          <a:fontRef idx="minor">
+            <a:schemeClr val="lt1"/>
+          </a:fontRef>
+        </p:style>
+        <p:txBody>
+          <a:bodyPr rtlCol="0" anchor="ctr"/>
+          <a:lstStyle/>
+          <a:p>
+            <a:pPr algn="ctr"/>
+            <a:r>
+              <a:rPr lang="en-US" b="1" dirty="0" smtClean="0">
+                <a:solidFill>
+                  <a:schemeClr val="tx1"/>
+                </a:solidFill>
+              </a:rPr>
+              <a:t>Token 1</a:t>
+            </a:r>
+            <a:endParaRPr lang="en-US" b="1" dirty="0">
+              <a:solidFill>
+                <a:schemeClr val="tx1"/>
+              </a:solidFill>
+            </a:endParaRPr>
+          </a:p>
+        </p:txBody>
+      </p:sp>
+      <p:sp>
+        <p:nvSpPr>
+          <p:cNvPr id="30" name="Rounded Rectangle 29"/>
+          <p:cNvSpPr/>
+          <p:nvPr/>
+        </p:nvSpPr>
+        <p:spPr>
+          <a:xfrm>
+            <a:off x="4495800" y="4724400"/>
+            <a:ext cx="1442508" cy="302260"/>
+          </a:xfrm>
+          <a:prstGeom prst="roundRect">
+            <a:avLst/>
+          </a:prstGeom>
+          <a:solidFill>
+            <a:schemeClr val="bg1">
+              <a:lumMod val="85000"/>
+            </a:schemeClr>
+          </a:solidFill>
+          <a:ln>
+            <a:solidFill>
+              <a:schemeClr val="tx1"/>
+            </a:solidFill>
+          </a:ln>
+        </p:spPr>
+        <p:style>
+          <a:lnRef idx="2">
+            <a:schemeClr val="accent1">
+              <a:shade val="50000"/>
+            </a:schemeClr>
+          </a:lnRef>
+          <a:fillRef idx="1">
+            <a:schemeClr val="accent1"/>
+          </a:fillRef>
+          <a:effectRef idx="0">
+            <a:schemeClr val="accent1"/>
+          </a:effectRef>
+          <a:fontRef idx="minor">
+            <a:schemeClr val="lt1"/>
+          </a:fontRef>
+        </p:style>
+        <p:txBody>
+          <a:bodyPr rtlCol="0" anchor="ctr"/>
+          <a:lstStyle/>
+          <a:p>
+            <a:pPr algn="ctr"/>
+            <a:r>
+              <a:rPr lang="en-US" b="1" dirty="0" smtClean="0">
+                <a:solidFill>
+                  <a:schemeClr val="tx1"/>
+                </a:solidFill>
+              </a:rPr>
+              <a:t>Token 2</a:t>
+            </a:r>
+            <a:endParaRPr lang="en-US" b="1" dirty="0">
+              <a:solidFill>
+                <a:schemeClr val="tx1"/>
+              </a:solidFill>
+            </a:endParaRPr>
+          </a:p>
+        </p:txBody>
+      </p:sp>
+      <p:sp>
+        <p:nvSpPr>
+          <p:cNvPr id="31" name="Rounded Rectangle 30"/>
+          <p:cNvSpPr/>
+          <p:nvPr/>
+        </p:nvSpPr>
+        <p:spPr>
+          <a:xfrm>
+            <a:off x="7162800" y="4724400"/>
+            <a:ext cx="1442508" cy="302260"/>
+          </a:xfrm>
+          <a:prstGeom prst="roundRect">
+            <a:avLst/>
+          </a:prstGeom>
+          <a:solidFill>
+            <a:schemeClr val="bg1">
+              <a:lumMod val="85000"/>
+            </a:schemeClr>
+          </a:solidFill>
+          <a:ln>
+            <a:solidFill>
+              <a:schemeClr val="tx1"/>
+            </a:solidFill>
+          </a:ln>
+        </p:spPr>
+        <p:style>
+          <a:lnRef idx="2">
+            <a:schemeClr val="accent1">
+              <a:shade val="50000"/>
+            </a:schemeClr>
+          </a:lnRef>
+          <a:fillRef idx="1">
+            <a:schemeClr val="accent1"/>
+          </a:fillRef>
+          <a:effectRef idx="0">
+            <a:schemeClr val="accent1"/>
+          </a:effectRef>
+          <a:fontRef idx="minor">
+            <a:schemeClr val="lt1"/>
+          </a:fontRef>
+        </p:style>
+        <p:txBody>
+          <a:bodyPr rtlCol="0" anchor="ctr"/>
+          <a:lstStyle/>
+          <a:p>
+            <a:pPr algn="ctr"/>
+            <a:r>
+              <a:rPr lang="en-US" b="1" dirty="0" smtClean="0">
+                <a:solidFill>
+                  <a:schemeClr val="tx1"/>
+                </a:solidFill>
+              </a:rPr>
+              <a:t>Token N</a:t>
+            </a:r>
+            <a:endParaRPr lang="en-US" b="1" dirty="0">
+              <a:solidFill>
+                <a:schemeClr val="tx1"/>
+              </a:solidFill>
+            </a:endParaRPr>
+          </a:p>
+        </p:txBody>
+      </p:sp>
+      <p:sp>
+        <p:nvSpPr>
+          <p:cNvPr id="32" name="Rounded Rectangle 31"/>
+          <p:cNvSpPr/>
+          <p:nvPr/>
+        </p:nvSpPr>
+        <p:spPr>
+          <a:xfrm>
+            <a:off x="6096000" y="4724400"/>
+            <a:ext cx="914400" cy="302260"/>
+          </a:xfrm>
+          <a:prstGeom prst="roundRect">
+            <a:avLst/>
+          </a:prstGeom>
+          <a:noFill/>
+          <a:ln>
+            <a:noFill/>
+          </a:ln>
+        </p:spPr>
+        <p:style>
+          <a:lnRef idx="2">
+            <a:schemeClr val="accent1">
+              <a:shade val="50000"/>
+            </a:schemeClr>
+          </a:lnRef>
+          <a:fillRef idx="1">
+            <a:schemeClr val="accent1"/>
+          </a:fillRef>
+          <a:effectRef idx="0">
+            <a:schemeClr val="accent1"/>
+          </a:effectRef>
+          <a:fontRef idx="minor">
+            <a:schemeClr val="lt1"/>
+          </a:fontRef>
+        </p:style>
+        <p:txBody>
+          <a:bodyPr rtlCol="0" anchor="ctr"/>
+          <a:lstStyle/>
+          <a:p>
+            <a:pPr algn="ctr"/>
+            <a:r>
+              <a:rPr lang="en-US" b="1" dirty="0" smtClean="0">
+                <a:solidFill>
+                  <a:schemeClr val="tx1"/>
+                </a:solidFill>
+              </a:rPr>
+              <a:t>…</a:t>
+            </a:r>
+            <a:endParaRPr lang="en-US" b="1" dirty="0">
+              <a:solidFill>
+                <a:schemeClr val="tx1"/>
+              </a:solidFill>
+            </a:endParaRPr>
+          </a:p>
+        </p:txBody>
+      </p:sp>
+      <p:sp>
+        <p:nvSpPr>
+          <p:cNvPr id="33" name="Rounded Rectangle 32"/>
+          <p:cNvSpPr/>
+          <p:nvPr/>
+        </p:nvSpPr>
+        <p:spPr>
+          <a:xfrm>
+            <a:off x="457200" y="3352800"/>
+            <a:ext cx="1447800" cy="302260"/>
+          </a:xfrm>
+          <a:prstGeom prst="roundRect">
+            <a:avLst/>
+          </a:prstGeom>
+          <a:noFill/>
+          <a:ln>
+            <a:noFill/>
+          </a:ln>
+        </p:spPr>
+        <p:style>
+          <a:lnRef idx="2">
+            <a:schemeClr val="accent1">
+              <a:shade val="50000"/>
+            </a:schemeClr>
+          </a:lnRef>
+          <a:fillRef idx="1">
+            <a:schemeClr val="accent1"/>
+          </a:fillRef>
+          <a:effectRef idx="0">
+            <a:schemeClr val="accent1"/>
+          </a:effectRef>
+          <a:fontRef idx="minor">
+            <a:schemeClr val="lt1"/>
+          </a:fontRef>
+        </p:style>
+        <p:txBody>
+          <a:bodyPr rtlCol="0" anchor="ctr"/>
+          <a:lstStyle/>
+          <a:p>
+            <a:pPr algn="ctr"/>
+            <a:r>
+              <a:rPr lang="en-US" b="1" dirty="0" smtClean="0">
+                <a:solidFill>
+                  <a:schemeClr val="tx1"/>
+                </a:solidFill>
+              </a:rPr>
+              <a:t>Term View</a:t>
+            </a:r>
+            <a:endParaRPr lang="en-US" b="1" dirty="0">
+              <a:solidFill>
+                <a:schemeClr val="tx1"/>
+              </a:solidFill>
+            </a:endParaRPr>
+          </a:p>
+        </p:txBody>
+      </p:sp>
+      <p:sp>
+        <p:nvSpPr>
+          <p:cNvPr id="34" name="Rounded Rectangle 33"/>
+          <p:cNvSpPr/>
+          <p:nvPr/>
+        </p:nvSpPr>
+        <p:spPr>
+          <a:xfrm>
+            <a:off x="533400" y="4038600"/>
+            <a:ext cx="1295400" cy="302260"/>
+          </a:xfrm>
+          <a:prstGeom prst="roundRect">
+            <a:avLst/>
+          </a:prstGeom>
+          <a:noFill/>
+          <a:ln>
+            <a:noFill/>
+          </a:ln>
+        </p:spPr>
+        <p:style>
+          <a:lnRef idx="2">
+            <a:schemeClr val="accent1">
+              <a:shade val="50000"/>
+            </a:schemeClr>
+          </a:lnRef>
+          <a:fillRef idx="1">
+            <a:schemeClr val="accent1"/>
+          </a:fillRef>
+          <a:effectRef idx="0">
+            <a:schemeClr val="accent1"/>
+          </a:effectRef>
+          <a:fontRef idx="minor">
+            <a:schemeClr val="lt1"/>
+          </a:fontRef>
+        </p:style>
+        <p:txBody>
+          <a:bodyPr rtlCol="0" anchor="ctr"/>
+          <a:lstStyle/>
+          <a:p>
+            <a:pPr algn="ctr"/>
+            <a:r>
+              <a:rPr lang="en-US" b="1" dirty="0" smtClean="0">
+                <a:solidFill>
+                  <a:schemeClr val="tx1"/>
+                </a:solidFill>
+              </a:rPr>
+              <a:t>POS View</a:t>
+            </a:r>
+            <a:endParaRPr lang="en-US" b="1" dirty="0">
+              <a:solidFill>
+                <a:schemeClr val="tx1"/>
+              </a:solidFill>
+            </a:endParaRPr>
+          </a:p>
+        </p:txBody>
+      </p:sp>
+      <p:sp>
+        <p:nvSpPr>
+          <p:cNvPr id="35" name="Rounded Rectangle 34"/>
+          <p:cNvSpPr/>
+          <p:nvPr/>
+        </p:nvSpPr>
+        <p:spPr>
+          <a:xfrm>
+            <a:off x="533400" y="4724400"/>
+            <a:ext cx="1295400" cy="302260"/>
+          </a:xfrm>
+          <a:prstGeom prst="roundRect">
+            <a:avLst/>
+          </a:prstGeom>
+          <a:noFill/>
+          <a:ln>
+            <a:noFill/>
+          </a:ln>
+        </p:spPr>
+        <p:style>
+          <a:lnRef idx="2">
+            <a:schemeClr val="accent1">
+              <a:shade val="50000"/>
+            </a:schemeClr>
+          </a:lnRef>
+          <a:fillRef idx="1">
+            <a:schemeClr val="accent1"/>
+          </a:fillRef>
+          <a:effectRef idx="0">
+            <a:schemeClr val="accent1"/>
+          </a:effectRef>
+          <a:fontRef idx="minor">
+            <a:schemeClr val="lt1"/>
+          </a:fontRef>
+        </p:style>
+        <p:txBody>
+          <a:bodyPr rtlCol="0" anchor="ctr"/>
+          <a:lstStyle/>
+          <a:p>
+            <a:pPr algn="ctr"/>
+            <a:r>
+              <a:rPr lang="en-US" b="1" dirty="0" smtClean="0">
+                <a:solidFill>
+                  <a:schemeClr val="tx1"/>
+                </a:solidFill>
+              </a:rPr>
+              <a:t>XXXX View</a:t>
+            </a:r>
+            <a:endParaRPr lang="en-US" b="1" dirty="0">
+              <a:solidFill>
+                <a:schemeClr val="tx1"/>
+              </a:solidFill>
+            </a:endParaRPr>
+          </a:p>
+        </p:txBody>
+      </p:sp>
     </p:spTree>
   </p:cSld>
   <p:clrMapOvr>

</xml_diff>